<commit_message>
removing class files from repo updating week1 slides to reflect modern changes to 220
</commit_message>
<xml_diff>
--- a/ClassMaterials/ArraysAndLists/Slides/Part2-JavaBuiltInArrays.pptx
+++ b/ClassMaterials/ArraysAndLists/Slides/Part2-JavaBuiltInArrays.pptx
@@ -3536,7 +3536,7 @@
           </a:ln>
           <a:extLst>
             <a:ext uri="{C572A759-6A51-4108-AA02-DFA0A04FC94B}">
-              <ma14:wrappingTextBoxFlag xmlns="" xmlns:ma14="http://schemas.microsoft.com/office/mac/drawingml/2011/main" val="1"/>
+              <ma14:wrappingTextBoxFlag xmlns:ma14="http://schemas.microsoft.com/office/mac/drawingml/2011/main" xmlns="" val="1"/>
             </a:ext>
           </a:extLst>
         </p:spPr>
@@ -3579,7 +3579,7 @@
           </a:ln>
           <a:extLst>
             <a:ext uri="{C572A759-6A51-4108-AA02-DFA0A04FC94B}">
-              <ma14:wrappingTextBoxFlag xmlns="" xmlns:ma14="http://schemas.microsoft.com/office/mac/drawingml/2011/main" val="1"/>
+              <ma14:wrappingTextBoxFlag xmlns:ma14="http://schemas.microsoft.com/office/mac/drawingml/2011/main" xmlns="" val="1"/>
             </a:ext>
           </a:extLst>
         </p:spPr>
@@ -4069,7 +4069,7 @@
           </a:ln>
           <a:extLst>
             <a:ext uri="{C572A759-6A51-4108-AA02-DFA0A04FC94B}">
-              <ma14:wrappingTextBoxFlag xmlns="" xmlns:ma14="http://schemas.microsoft.com/office/mac/drawingml/2011/main" val="1"/>
+              <ma14:wrappingTextBoxFlag xmlns:ma14="http://schemas.microsoft.com/office/mac/drawingml/2011/main" xmlns="" val="1"/>
             </a:ext>
           </a:extLst>
         </p:spPr>
@@ -5709,7 +5709,7 @@
             <a:effectLst/>
             <a:extLst>
               <a:ext uri="{C572A759-6A51-4108-AA02-DFA0A04FC94B}">
-                <ma14:wrappingTextBoxFlag xmlns="" xmlns:ma14="http://schemas.microsoft.com/office/mac/drawingml/2011/main" val="1"/>
+                <ma14:wrappingTextBoxFlag xmlns:ma14="http://schemas.microsoft.com/office/mac/drawingml/2011/main" xmlns="" val="1"/>
               </a:ext>
             </a:extLst>
           </p:spPr>
@@ -5904,7 +5904,7 @@
             <a:effectLst/>
             <a:extLst>
               <a:ext uri="{C572A759-6A51-4108-AA02-DFA0A04FC94B}">
-                <ma14:wrappingTextBoxFlag xmlns="" xmlns:ma14="http://schemas.microsoft.com/office/mac/drawingml/2011/main" val="1"/>
+                <ma14:wrappingTextBoxFlag xmlns:ma14="http://schemas.microsoft.com/office/mac/drawingml/2011/main" xmlns="" val="1"/>
               </a:ext>
             </a:extLst>
           </p:spPr>
@@ -6632,7 +6632,31 @@
                 <a:cs typeface="Courier New" panose="02070309020205020404" pitchFamily="49" charset="0"/>
                 <a:sym typeface="Consolas"/>
               </a:rPr>
-              <a:t> score : scores) {</a:t>
+              <a:t> </a:t>
+            </a:r>
+            <a:r>
+              <a:rPr lang="en-US" sz="2000" dirty="0">
+                <a:solidFill>
+                  <a:schemeClr val="tx1"/>
+                </a:solidFill>
+                <a:latin typeface="Courier New" panose="02070309020205020404" pitchFamily="49" charset="0"/>
+                <a:ea typeface="Consolas"/>
+                <a:cs typeface="Courier New" panose="02070309020205020404" pitchFamily="49" charset="0"/>
+                <a:sym typeface="Consolas"/>
+              </a:rPr>
+              <a:t>xx</a:t>
+            </a:r>
+            <a:r>
+              <a:rPr sz="2000" dirty="0">
+                <a:solidFill>
+                  <a:schemeClr val="tx1"/>
+                </a:solidFill>
+                <a:latin typeface="Courier New" panose="02070309020205020404" pitchFamily="49" charset="0"/>
+                <a:ea typeface="Consolas"/>
+                <a:cs typeface="Courier New" panose="02070309020205020404" pitchFamily="49" charset="0"/>
+                <a:sym typeface="Consolas"/>
+              </a:rPr>
+              <a:t> : scores) {</a:t>
             </a:r>
             <a:br>
               <a:rPr sz="2000" dirty="0">
@@ -6655,7 +6679,31 @@
                 <a:cs typeface="Courier New" panose="02070309020205020404" pitchFamily="49" charset="0"/>
                 <a:sym typeface="Consolas"/>
               </a:rPr>
-              <a:t>	sum += score;</a:t>
+              <a:t>	sum += </a:t>
+            </a:r>
+            <a:r>
+              <a:rPr lang="en-US" sz="2000" dirty="0">
+                <a:solidFill>
+                  <a:schemeClr val="tx1"/>
+                </a:solidFill>
+                <a:latin typeface="Courier New" panose="02070309020205020404" pitchFamily="49" charset="0"/>
+                <a:ea typeface="Consolas"/>
+                <a:cs typeface="Courier New" panose="02070309020205020404" pitchFamily="49" charset="0"/>
+                <a:sym typeface="Consolas"/>
+              </a:rPr>
+              <a:t>xx</a:t>
+            </a:r>
+            <a:r>
+              <a:rPr sz="2000" dirty="0">
+                <a:solidFill>
+                  <a:schemeClr val="tx1"/>
+                </a:solidFill>
+                <a:latin typeface="Courier New" panose="02070309020205020404" pitchFamily="49" charset="0"/>
+                <a:ea typeface="Consolas"/>
+                <a:cs typeface="Courier New" panose="02070309020205020404" pitchFamily="49" charset="0"/>
+                <a:sym typeface="Consolas"/>
+              </a:rPr>
+              <a:t>;</a:t>
             </a:r>
             <a:br>
               <a:rPr sz="2000" dirty="0">

</xml_diff>

<commit_message>
fix typo array notation
</commit_message>
<xml_diff>
--- a/ClassMaterials/ArraysAndLists/Slides/Part2-JavaBuiltInArrays.pptx
+++ b/ClassMaterials/ArraysAndLists/Slides/Part2-JavaBuiltInArrays.pptx
@@ -3536,7 +3536,7 @@
           </a:ln>
           <a:extLst>
             <a:ext uri="{C572A759-6A51-4108-AA02-DFA0A04FC94B}">
-              <ma14:wrappingTextBoxFlag xmlns:ma14="http://schemas.microsoft.com/office/mac/drawingml/2011/main" xmlns="" val="1"/>
+              <ma14:wrappingTextBoxFlag xmlns="" xmlns:ma14="http://schemas.microsoft.com/office/mac/drawingml/2011/main" val="1"/>
             </a:ext>
           </a:extLst>
         </p:spPr>
@@ -3579,7 +3579,7 @@
           </a:ln>
           <a:extLst>
             <a:ext uri="{C572A759-6A51-4108-AA02-DFA0A04FC94B}">
-              <ma14:wrappingTextBoxFlag xmlns:ma14="http://schemas.microsoft.com/office/mac/drawingml/2011/main" xmlns="" val="1"/>
+              <ma14:wrappingTextBoxFlag xmlns="" xmlns:ma14="http://schemas.microsoft.com/office/mac/drawingml/2011/main" val="1"/>
             </a:ext>
           </a:extLst>
         </p:spPr>
@@ -4069,7 +4069,7 @@
           </a:ln>
           <a:extLst>
             <a:ext uri="{C572A759-6A51-4108-AA02-DFA0A04FC94B}">
-              <ma14:wrappingTextBoxFlag xmlns:ma14="http://schemas.microsoft.com/office/mac/drawingml/2011/main" xmlns="" val="1"/>
+              <ma14:wrappingTextBoxFlag xmlns="" xmlns:ma14="http://schemas.microsoft.com/office/mac/drawingml/2011/main" val="1"/>
             </a:ext>
           </a:extLst>
         </p:spPr>
@@ -5709,7 +5709,7 @@
             <a:effectLst/>
             <a:extLst>
               <a:ext uri="{C572A759-6A51-4108-AA02-DFA0A04FC94B}">
-                <ma14:wrappingTextBoxFlag xmlns:ma14="http://schemas.microsoft.com/office/mac/drawingml/2011/main" xmlns="" val="1"/>
+                <ma14:wrappingTextBoxFlag xmlns="" xmlns:ma14="http://schemas.microsoft.com/office/mac/drawingml/2011/main" val="1"/>
               </a:ext>
             </a:extLst>
           </p:spPr>
@@ -5904,7 +5904,7 @@
             <a:effectLst/>
             <a:extLst>
               <a:ext uri="{C572A759-6A51-4108-AA02-DFA0A04FC94B}">
-                <ma14:wrappingTextBoxFlag xmlns:ma14="http://schemas.microsoft.com/office/mac/drawingml/2011/main" xmlns="" val="1"/>
+                <ma14:wrappingTextBoxFlag xmlns="" xmlns:ma14="http://schemas.microsoft.com/office/mac/drawingml/2011/main" val="1"/>
               </a:ext>
             </a:extLst>
           </p:spPr>
@@ -8742,14 +8742,14 @@
                 <a:latin typeface="Courier New"/>
                 <a:cs typeface="Courier New"/>
               </a:rPr>
-              <a:t>int</a:t>
+              <a:t>int[]</a:t>
             </a:r>
             <a:r>
               <a:rPr lang="en-US" sz="1200" dirty="0">
                 <a:latin typeface="Courier New"/>
                 <a:cs typeface="Courier New"/>
               </a:rPr>
-              <a:t> a1[] = { 5, 1, 7, 10 };</a:t>
+              <a:t> a1 = { 5, 1, 7, 10 };</a:t>
             </a:r>
           </a:p>
           <a:p>

</xml_diff>